<commit_message>
version 0.1 for ppt By joey.
</commit_message>
<xml_diff>
--- a/衡泰新人分享--如何快速适应新公司.pptx
+++ b/衡泰新人分享--如何快速适应新公司.pptx
@@ -8,13 +8,16 @@
     <p:notesMasterId r:id="rId4"/>
   </p:notesMasterIdLst>
   <p:handoutMasterIdLst>
-    <p:handoutMasterId r:id="rId8"/>
+    <p:handoutMasterId r:id="rId11"/>
   </p:handoutMasterIdLst>
   <p:sldIdLst>
     <p:sldId id="259" r:id="rId3"/>
     <p:sldId id="472" r:id="rId5"/>
-    <p:sldId id="464" r:id="rId6"/>
-    <p:sldId id="263" r:id="rId7"/>
+    <p:sldId id="476" r:id="rId6"/>
+    <p:sldId id="464" r:id="rId7"/>
+    <p:sldId id="477" r:id="rId8"/>
+    <p:sldId id="475" r:id="rId9"/>
+    <p:sldId id="263" r:id="rId10"/>
   </p:sldIdLst>
   <p:sldSz cx="9144000" cy="6858000" type="screen4x3"/>
   <p:notesSz cx="6858000" cy="9144000"/>
@@ -4502,6 +4505,245 @@
           </a:fontRef>
         </p:style>
       </p:cxnSp>
+      <p:sp>
+        <p:nvSpPr>
+          <p:cNvPr id="2" name="TextBox 7"/>
+          <p:cNvSpPr txBox="1"/>
+          <p:nvPr/>
+        </p:nvSpPr>
+        <p:spPr>
+          <a:xfrm>
+            <a:off x="1502078" y="3414008"/>
+            <a:ext cx="6139844" cy="460375"/>
+          </a:xfrm>
+          <a:prstGeom prst="rect">
+            <a:avLst/>
+          </a:prstGeom>
+          <a:noFill/>
+        </p:spPr>
+        <p:txBody>
+          <a:bodyPr wrap="square" rtlCol="0">
+            <a:spAutoFit/>
+          </a:bodyPr>
+          <a:p>
+            <a:pPr algn="l"/>
+            <a:r>
+              <a:rPr lang="en-US" altLang="zh-CN" sz="2400" dirty="0">
+                <a:solidFill>
+                  <a:schemeClr val="accent1">
+                    <a:lumMod val="75000"/>
+                  </a:schemeClr>
+                </a:solidFill>
+              </a:rPr>
+              <a:t>2</a:t>
+            </a:r>
+            <a:r>
+              <a:rPr lang="zh-CN" altLang="en-US" sz="2400" dirty="0">
+                <a:solidFill>
+                  <a:schemeClr val="accent1">
+                    <a:lumMod val="75000"/>
+                  </a:schemeClr>
+                </a:solidFill>
+              </a:rPr>
+              <a:t>、如何入手工作（开发为例）</a:t>
+            </a:r>
+            <a:endParaRPr lang="zh-CN" altLang="en-US" sz="2400" dirty="0">
+              <a:solidFill>
+                <a:schemeClr val="accent1">
+                  <a:lumMod val="75000"/>
+                </a:schemeClr>
+              </a:solidFill>
+            </a:endParaRPr>
+          </a:p>
+        </p:txBody>
+      </p:sp>
+      <p:sp>
+        <p:nvSpPr>
+          <p:cNvPr id="3" name="TextBox 7"/>
+          <p:cNvSpPr txBox="1"/>
+          <p:nvPr/>
+        </p:nvSpPr>
+        <p:spPr>
+          <a:xfrm>
+            <a:off x="1501775" y="2559685"/>
+            <a:ext cx="7694930" cy="460375"/>
+          </a:xfrm>
+          <a:prstGeom prst="rect">
+            <a:avLst/>
+          </a:prstGeom>
+          <a:noFill/>
+        </p:spPr>
+        <p:txBody>
+          <a:bodyPr wrap="square" rtlCol="0">
+            <a:spAutoFit/>
+          </a:bodyPr>
+          <a:p>
+            <a:pPr algn="l"/>
+            <a:r>
+              <a:rPr lang="en-US" altLang="zh-CN" sz="2400" dirty="0">
+                <a:solidFill>
+                  <a:schemeClr val="accent1">
+                    <a:lumMod val="75000"/>
+                  </a:schemeClr>
+                </a:solidFill>
+              </a:rPr>
+              <a:t>1</a:t>
+            </a:r>
+            <a:r>
+              <a:rPr lang="zh-CN" altLang="en-US" sz="2400" dirty="0">
+                <a:solidFill>
+                  <a:schemeClr val="accent1">
+                    <a:lumMod val="75000"/>
+                  </a:schemeClr>
+                </a:solidFill>
+              </a:rPr>
+              <a:t>、如何熟悉同事</a:t>
+            </a:r>
+            <a:r>
+              <a:rPr lang="en-US" altLang="zh-CN" sz="2400" dirty="0">
+                <a:solidFill>
+                  <a:schemeClr val="accent1">
+                    <a:lumMod val="75000"/>
+                  </a:schemeClr>
+                </a:solidFill>
+              </a:rPr>
+              <a:t>(</a:t>
+            </a:r>
+            <a:r>
+              <a:rPr lang="zh-CN" altLang="en-US" sz="2400" dirty="0">
+                <a:solidFill>
+                  <a:schemeClr val="accent1">
+                    <a:lumMod val="75000"/>
+                  </a:schemeClr>
+                </a:solidFill>
+                <a:sym typeface="+mn-ea"/>
+              </a:rPr>
+              <a:t>两者相辅相成</a:t>
+            </a:r>
+            <a:r>
+              <a:rPr lang="en-US" altLang="zh-CN" sz="2400" dirty="0">
+                <a:solidFill>
+                  <a:schemeClr val="accent1">
+                    <a:lumMod val="75000"/>
+                  </a:schemeClr>
+                </a:solidFill>
+              </a:rPr>
+              <a:t>)</a:t>
+            </a:r>
+            <a:endParaRPr lang="en-US" altLang="zh-CN" sz="2400" dirty="0">
+              <a:solidFill>
+                <a:schemeClr val="accent1">
+                  <a:lumMod val="75000"/>
+                </a:schemeClr>
+              </a:solidFill>
+            </a:endParaRPr>
+          </a:p>
+        </p:txBody>
+      </p:sp>
+      <p:sp>
+        <p:nvSpPr>
+          <p:cNvPr id="4" name="TextBox 7"/>
+          <p:cNvSpPr txBox="1"/>
+          <p:nvPr/>
+        </p:nvSpPr>
+        <p:spPr>
+          <a:xfrm>
+            <a:off x="1502078" y="4170928"/>
+            <a:ext cx="6139844" cy="460375"/>
+          </a:xfrm>
+          <a:prstGeom prst="rect">
+            <a:avLst/>
+          </a:prstGeom>
+          <a:noFill/>
+        </p:spPr>
+        <p:txBody>
+          <a:bodyPr wrap="square" rtlCol="0">
+            <a:spAutoFit/>
+          </a:bodyPr>
+          <a:p>
+            <a:pPr algn="l"/>
+            <a:r>
+              <a:rPr lang="en-US" altLang="zh-CN" sz="2400" dirty="0">
+                <a:solidFill>
+                  <a:schemeClr val="accent1">
+                    <a:lumMod val="75000"/>
+                  </a:schemeClr>
+                </a:solidFill>
+              </a:rPr>
+              <a:t>3</a:t>
+            </a:r>
+            <a:r>
+              <a:rPr lang="zh-CN" altLang="en-US" sz="2400" dirty="0">
+                <a:solidFill>
+                  <a:schemeClr val="accent1">
+                    <a:lumMod val="75000"/>
+                  </a:schemeClr>
+                </a:solidFill>
+              </a:rPr>
+              <a:t>、其他</a:t>
+            </a:r>
+            <a:endParaRPr lang="zh-CN" altLang="en-US" sz="2400" dirty="0">
+              <a:solidFill>
+                <a:schemeClr val="accent1">
+                  <a:lumMod val="75000"/>
+                </a:schemeClr>
+              </a:solidFill>
+            </a:endParaRPr>
+          </a:p>
+        </p:txBody>
+      </p:sp>
+      <p:sp>
+        <p:nvSpPr>
+          <p:cNvPr id="7" name="TextBox 7"/>
+          <p:cNvSpPr txBox="1"/>
+          <p:nvPr/>
+        </p:nvSpPr>
+        <p:spPr>
+          <a:xfrm>
+            <a:off x="1502078" y="4942453"/>
+            <a:ext cx="6139844" cy="583565"/>
+          </a:xfrm>
+          <a:prstGeom prst="rect">
+            <a:avLst/>
+          </a:prstGeom>
+          <a:noFill/>
+        </p:spPr>
+        <p:txBody>
+          <a:bodyPr wrap="square" rtlCol="0">
+            <a:spAutoFit/>
+          </a:bodyPr>
+          <a:p>
+            <a:pPr algn="l"/>
+            <a:r>
+              <a:rPr lang="zh-CN" altLang="en-US" sz="2400" dirty="0">
+                <a:solidFill>
+                  <a:schemeClr val="accent1">
+                    <a:lumMod val="75000"/>
+                  </a:schemeClr>
+                </a:solidFill>
+              </a:rPr>
+              <a:t>重点：</a:t>
+            </a:r>
+            <a:r>
+              <a:rPr lang="zh-CN" altLang="en-US" sz="3200" dirty="0">
+                <a:solidFill>
+                  <a:schemeClr val="accent1">
+                    <a:lumMod val="75000"/>
+                  </a:schemeClr>
+                </a:solidFill>
+              </a:rPr>
+              <a:t>沟通</a:t>
+            </a:r>
+            <a:endParaRPr lang="zh-CN" altLang="en-US" sz="3200" dirty="0">
+              <a:solidFill>
+                <a:schemeClr val="accent1">
+                  <a:lumMod val="75000"/>
+                </a:schemeClr>
+              </a:solidFill>
+            </a:endParaRPr>
+          </a:p>
+        </p:txBody>
+      </p:sp>
     </p:spTree>
   </p:cSld>
   <p:clrMapOvr>
@@ -4579,6 +4821,156 @@
           </a:p>
         </p:txBody>
       </p:sp>
+      <p:sp>
+        <p:nvSpPr>
+          <p:cNvPr id="4" name="TextBox 7"/>
+          <p:cNvSpPr txBox="1"/>
+          <p:nvPr/>
+        </p:nvSpPr>
+        <p:spPr>
+          <a:xfrm>
+            <a:off x="1039163" y="1400423"/>
+            <a:ext cx="6139844" cy="460375"/>
+          </a:xfrm>
+          <a:prstGeom prst="rect">
+            <a:avLst/>
+          </a:prstGeom>
+          <a:noFill/>
+        </p:spPr>
+        <p:txBody>
+          <a:bodyPr wrap="square" rtlCol="0">
+            <a:spAutoFit/>
+          </a:bodyPr>
+          <a:p>
+            <a:pPr algn="ctr"/>
+            <a:r>
+              <a:rPr lang="en-US" altLang="zh-CN" sz="2400" dirty="0">
+                <a:solidFill>
+                  <a:schemeClr val="accent1">
+                    <a:lumMod val="75000"/>
+                  </a:schemeClr>
+                </a:solidFill>
+              </a:rPr>
+              <a:t>1</a:t>
+            </a:r>
+            <a:r>
+              <a:rPr lang="zh-CN" altLang="en-US" sz="2400" dirty="0">
+                <a:solidFill>
+                  <a:schemeClr val="accent1">
+                    <a:lumMod val="75000"/>
+                  </a:schemeClr>
+                </a:solidFill>
+              </a:rPr>
+              <a:t>、如何熟悉同事</a:t>
+            </a:r>
+            <a:endParaRPr lang="zh-CN" altLang="en-US" sz="2400" dirty="0">
+              <a:solidFill>
+                <a:schemeClr val="accent1">
+                  <a:lumMod val="75000"/>
+                </a:schemeClr>
+              </a:solidFill>
+            </a:endParaRPr>
+          </a:p>
+        </p:txBody>
+      </p:sp>
+      <p:sp>
+        <p:nvSpPr>
+          <p:cNvPr id="5" name="文本框 4"/>
+          <p:cNvSpPr txBox="1"/>
+          <p:nvPr/>
+        </p:nvSpPr>
+        <p:spPr>
+          <a:xfrm>
+            <a:off x="1726565" y="2206625"/>
+            <a:ext cx="5603240" cy="3138170"/>
+          </a:xfrm>
+          <a:prstGeom prst="rect">
+            <a:avLst/>
+          </a:prstGeom>
+          <a:noFill/>
+        </p:spPr>
+        <p:txBody>
+          <a:bodyPr wrap="square" rtlCol="0">
+            <a:spAutoFit/>
+          </a:bodyPr>
+          <a:p>
+            <a:pPr algn="l"/>
+            <a:r>
+              <a:rPr lang="en-US" altLang="zh-CN"/>
+              <a:t>1</a:t>
+            </a:r>
+            <a:r>
+              <a:rPr lang="zh-CN" altLang="en-US"/>
+              <a:t>、报导师大腿</a:t>
+            </a:r>
+            <a:endParaRPr lang="zh-CN" altLang="en-US"/>
+          </a:p>
+          <a:p>
+            <a:pPr algn="l"/>
+            <a:endParaRPr lang="zh-CN" altLang="en-US"/>
+          </a:p>
+          <a:p>
+            <a:pPr algn="l"/>
+            <a:r>
+              <a:rPr lang="en-US" altLang="zh-CN"/>
+              <a:t>2</a:t>
+            </a:r>
+            <a:r>
+              <a:rPr lang="zh-CN" altLang="en-US"/>
+              <a:t>、蹭饭</a:t>
+            </a:r>
+            <a:endParaRPr lang="zh-CN" altLang="en-US"/>
+          </a:p>
+          <a:p>
+            <a:pPr algn="l"/>
+            <a:r>
+              <a:rPr lang="zh-CN" altLang="en-US"/>
+              <a:t> </a:t>
+            </a:r>
+            <a:endParaRPr lang="zh-CN" altLang="en-US"/>
+          </a:p>
+          <a:p>
+            <a:pPr algn="l"/>
+            <a:r>
+              <a:rPr lang="en-US" altLang="zh-CN"/>
+              <a:t>3</a:t>
+            </a:r>
+            <a:r>
+              <a:rPr lang="zh-CN" altLang="en-US"/>
+              <a:t>、参加活动（运动类，羽毛球，篮球，健身）</a:t>
+            </a:r>
+            <a:endParaRPr lang="zh-CN" altLang="en-US"/>
+          </a:p>
+          <a:p>
+            <a:pPr algn="l"/>
+            <a:endParaRPr lang="zh-CN" altLang="en-US"/>
+          </a:p>
+          <a:p>
+            <a:pPr algn="l"/>
+            <a:endParaRPr lang="zh-CN" altLang="en-US"/>
+          </a:p>
+          <a:p>
+            <a:pPr algn="l"/>
+            <a:endParaRPr lang="zh-CN" altLang="en-US"/>
+          </a:p>
+          <a:p>
+            <a:pPr algn="l"/>
+            <a:endParaRPr lang="zh-CN" altLang="en-US"/>
+          </a:p>
+          <a:p>
+            <a:pPr algn="l"/>
+            <a:endParaRPr lang="zh-CN" altLang="en-US"/>
+          </a:p>
+          <a:p>
+            <a:pPr algn="l"/>
+            <a:r>
+              <a:rPr lang="zh-CN" altLang="en-US"/>
+              <a:t> </a:t>
+            </a:r>
+            <a:endParaRPr lang="en-US" altLang="zh-CN"/>
+          </a:p>
+        </p:txBody>
+      </p:sp>
     </p:spTree>
   </p:cSld>
   <p:clrMapOvr>
@@ -4595,6 +4987,691 @@
 </file>
 
 <file path=ppt/slides/slide4.xml><?xml version="1.0" encoding="utf-8"?>
+<p:sld xmlns:a="http://schemas.openxmlformats.org/drawingml/2006/main" xmlns:r="http://schemas.openxmlformats.org/officeDocument/2006/relationships" xmlns:p="http://schemas.openxmlformats.org/presentationml/2006/main">
+  <p:cSld>
+    <p:spTree>
+      <p:nvGrpSpPr>
+        <p:cNvPr id="1" name=""/>
+        <p:cNvGrpSpPr/>
+        <p:nvPr/>
+      </p:nvGrpSpPr>
+      <p:grpSpPr>
+        <a:xfrm>
+          <a:off x="0" y="0"/>
+          <a:ext cx="0" cy="0"/>
+          <a:chOff x="0" y="0"/>
+          <a:chExt cx="0" cy="0"/>
+        </a:xfrm>
+      </p:grpSpPr>
+      <p:sp>
+        <p:nvSpPr>
+          <p:cNvPr id="2" name="标题 1"/>
+          <p:cNvSpPr>
+            <a:spLocks noGrp="1"/>
+          </p:cNvSpPr>
+          <p:nvPr>
+            <p:ph type="title"/>
+          </p:nvPr>
+        </p:nvSpPr>
+        <p:spPr/>
+        <p:txBody>
+          <a:bodyPr/>
+          <a:lstStyle/>
+          <a:p>
+            <a:r>
+              <a:rPr lang="zh-CN" altLang="en-US" dirty="0" smtClean="0"/>
+              <a:t>主题</a:t>
+            </a:r>
+            <a:endParaRPr lang="zh-CN" altLang="en-US" dirty="0"/>
+          </a:p>
+        </p:txBody>
+      </p:sp>
+      <p:sp>
+        <p:nvSpPr>
+          <p:cNvPr id="3" name="灯片编号占位符 2"/>
+          <p:cNvSpPr>
+            <a:spLocks noGrp="1"/>
+          </p:cNvSpPr>
+          <p:nvPr>
+            <p:ph type="sldNum" sz="quarter" idx="12"/>
+          </p:nvPr>
+        </p:nvSpPr>
+        <p:spPr/>
+        <p:txBody>
+          <a:bodyPr/>
+          <a:lstStyle/>
+          <a:p>
+            <a:fld id="{C8682688-2DC9-4990-BBF8-8D9E27776FB3}" type="slidenum">
+              <a:rPr lang="zh-CN" altLang="en-US" smtClean="0"/>
+            </a:fld>
+            <a:endParaRPr lang="zh-CN" altLang="en-US"/>
+          </a:p>
+        </p:txBody>
+      </p:sp>
+      <p:sp>
+        <p:nvSpPr>
+          <p:cNvPr id="4" name="TextBox 7"/>
+          <p:cNvSpPr txBox="1"/>
+          <p:nvPr/>
+        </p:nvSpPr>
+        <p:spPr>
+          <a:xfrm>
+            <a:off x="827073" y="1253103"/>
+            <a:ext cx="6139844" cy="460375"/>
+          </a:xfrm>
+          <a:prstGeom prst="rect">
+            <a:avLst/>
+          </a:prstGeom>
+          <a:noFill/>
+        </p:spPr>
+        <p:txBody>
+          <a:bodyPr wrap="square" rtlCol="0">
+            <a:spAutoFit/>
+          </a:bodyPr>
+          <a:p>
+            <a:pPr algn="ctr"/>
+            <a:r>
+              <a:rPr lang="en-US" altLang="zh-CN" sz="2400" dirty="0">
+                <a:solidFill>
+                  <a:schemeClr val="accent1">
+                    <a:lumMod val="75000"/>
+                  </a:schemeClr>
+                </a:solidFill>
+              </a:rPr>
+              <a:t>2</a:t>
+            </a:r>
+            <a:r>
+              <a:rPr lang="zh-CN" altLang="en-US" sz="2400" dirty="0">
+                <a:solidFill>
+                  <a:schemeClr val="accent1">
+                    <a:lumMod val="75000"/>
+                  </a:schemeClr>
+                </a:solidFill>
+              </a:rPr>
+              <a:t>、如何入手工作（开发为例）</a:t>
+            </a:r>
+            <a:endParaRPr lang="zh-CN" altLang="en-US" sz="2400" dirty="0">
+              <a:solidFill>
+                <a:schemeClr val="accent1">
+                  <a:lumMod val="75000"/>
+                </a:schemeClr>
+              </a:solidFill>
+            </a:endParaRPr>
+          </a:p>
+        </p:txBody>
+      </p:sp>
+      <p:sp>
+        <p:nvSpPr>
+          <p:cNvPr id="5" name="文本框 4"/>
+          <p:cNvSpPr txBox="1"/>
+          <p:nvPr/>
+        </p:nvSpPr>
+        <p:spPr>
+          <a:xfrm>
+            <a:off x="1726565" y="2206625"/>
+            <a:ext cx="5603240" cy="3692525"/>
+          </a:xfrm>
+          <a:prstGeom prst="rect">
+            <a:avLst/>
+          </a:prstGeom>
+          <a:noFill/>
+        </p:spPr>
+        <p:txBody>
+          <a:bodyPr wrap="square" rtlCol="0">
+            <a:spAutoFit/>
+          </a:bodyPr>
+          <a:p>
+            <a:pPr algn="l"/>
+            <a:r>
+              <a:rPr lang="en-US" altLang="zh-CN"/>
+              <a:t>1</a:t>
+            </a:r>
+            <a:r>
+              <a:rPr lang="zh-CN" altLang="en-US"/>
+              <a:t>、</a:t>
+            </a:r>
+            <a:r>
+              <a:rPr lang="zh-CN" altLang="en-US"/>
+              <a:t>技术  把握大体 寻找交集与差异 相对优势点</a:t>
+            </a:r>
+            <a:endParaRPr lang="zh-CN" altLang="en-US"/>
+          </a:p>
+          <a:p>
+            <a:pPr algn="l"/>
+            <a:endParaRPr lang="zh-CN" altLang="en-US"/>
+          </a:p>
+          <a:p>
+            <a:pPr algn="l"/>
+            <a:r>
+              <a:rPr lang="zh-CN" altLang="en-US"/>
+              <a:t>技术栈：语言 框架 规范</a:t>
+            </a:r>
+            <a:r>
+              <a:rPr lang="en-US" altLang="zh-CN"/>
+              <a:t>(</a:t>
+            </a:r>
+            <a:r>
+              <a:rPr lang="zh-CN" altLang="en-US"/>
+              <a:t>风格</a:t>
+            </a:r>
+            <a:r>
+              <a:rPr lang="en-US" altLang="zh-CN"/>
+              <a:t>)</a:t>
+            </a:r>
+            <a:endParaRPr lang="en-US" altLang="zh-CN"/>
+          </a:p>
+          <a:p>
+            <a:pPr algn="l"/>
+            <a:endParaRPr lang="en-US" altLang="zh-CN"/>
+          </a:p>
+          <a:p>
+            <a:pPr algn="l"/>
+            <a:r>
+              <a:rPr lang="zh-CN" altLang="en-US"/>
+              <a:t>此基础上查漏补缺，本人</a:t>
+            </a:r>
+            <a:r>
+              <a:rPr lang="en-US" altLang="zh-CN"/>
+              <a:t>oracle</a:t>
+            </a:r>
+            <a:r>
+              <a:rPr lang="zh-CN" altLang="en-US"/>
+              <a:t>技能不足</a:t>
+            </a:r>
+            <a:endParaRPr lang="zh-CN" altLang="en-US"/>
+          </a:p>
+          <a:p>
+            <a:pPr algn="l"/>
+            <a:endParaRPr lang="en-US" altLang="zh-CN"/>
+          </a:p>
+          <a:p>
+            <a:pPr algn="l"/>
+            <a:r>
+              <a:rPr lang="zh-CN" altLang="en-US"/>
+              <a:t>再深一步，建议项目组更好的选择  </a:t>
+            </a:r>
+            <a:r>
+              <a:rPr lang="en-US" altLang="zh-CN"/>
+              <a:t>webapi2</a:t>
+            </a:r>
+            <a:endParaRPr lang="en-US" altLang="zh-CN"/>
+          </a:p>
+          <a:p>
+            <a:pPr algn="l"/>
+            <a:endParaRPr lang="en-US" altLang="zh-CN"/>
+          </a:p>
+          <a:p>
+            <a:pPr algn="l"/>
+            <a:r>
+              <a:rPr lang="en-US" altLang="zh-CN"/>
+              <a:t>2</a:t>
+            </a:r>
+            <a:r>
+              <a:rPr lang="zh-CN" altLang="en-US"/>
+              <a:t>、业务  </a:t>
+            </a:r>
+            <a:r>
+              <a:rPr lang="zh-CN" altLang="en-US">
+                <a:sym typeface="+mn-ea"/>
+              </a:rPr>
+              <a:t>由点及面，从简到繁。</a:t>
+            </a:r>
+            <a:endParaRPr lang="en-US" altLang="zh-CN"/>
+          </a:p>
+          <a:p>
+            <a:pPr algn="l"/>
+            <a:endParaRPr lang="zh-CN" altLang="en-US"/>
+          </a:p>
+          <a:p>
+            <a:pPr algn="l"/>
+            <a:endParaRPr lang="zh-CN" altLang="en-US"/>
+          </a:p>
+          <a:p>
+            <a:pPr algn="l"/>
+            <a:endParaRPr lang="zh-CN" altLang="en-US"/>
+          </a:p>
+          <a:p>
+            <a:pPr algn="l"/>
+            <a:r>
+              <a:rPr lang="zh-CN" altLang="en-US"/>
+              <a:t> </a:t>
+            </a:r>
+            <a:endParaRPr lang="en-US" altLang="zh-CN"/>
+          </a:p>
+        </p:txBody>
+      </p:sp>
+    </p:spTree>
+  </p:cSld>
+  <p:clrMapOvr>
+    <a:masterClrMapping/>
+  </p:clrMapOvr>
+  <p:timing>
+    <p:tnLst>
+      <p:par>
+        <p:cTn id="1" dur="indefinite" restart="never" nodeType="tmRoot"/>
+      </p:par>
+    </p:tnLst>
+  </p:timing>
+</p:sld>
+</file>
+
+<file path=ppt/slides/slide5.xml><?xml version="1.0" encoding="utf-8"?>
+<p:sld xmlns:a="http://schemas.openxmlformats.org/drawingml/2006/main" xmlns:r="http://schemas.openxmlformats.org/officeDocument/2006/relationships" xmlns:p="http://schemas.openxmlformats.org/presentationml/2006/main">
+  <p:cSld>
+    <p:spTree>
+      <p:nvGrpSpPr>
+        <p:cNvPr id="1" name=""/>
+        <p:cNvGrpSpPr/>
+        <p:nvPr/>
+      </p:nvGrpSpPr>
+      <p:grpSpPr>
+        <a:xfrm>
+          <a:off x="0" y="0"/>
+          <a:ext cx="0" cy="0"/>
+          <a:chOff x="0" y="0"/>
+          <a:chExt cx="0" cy="0"/>
+        </a:xfrm>
+      </p:grpSpPr>
+      <p:sp>
+        <p:nvSpPr>
+          <p:cNvPr id="2" name="标题 1"/>
+          <p:cNvSpPr>
+            <a:spLocks noGrp="1"/>
+          </p:cNvSpPr>
+          <p:nvPr>
+            <p:ph type="title"/>
+          </p:nvPr>
+        </p:nvSpPr>
+        <p:spPr/>
+        <p:txBody>
+          <a:bodyPr/>
+          <a:lstStyle/>
+          <a:p>
+            <a:r>
+              <a:rPr lang="zh-CN" altLang="en-US" dirty="0" smtClean="0"/>
+              <a:t>主题</a:t>
+            </a:r>
+            <a:endParaRPr lang="zh-CN" altLang="en-US" dirty="0"/>
+          </a:p>
+        </p:txBody>
+      </p:sp>
+      <p:sp>
+        <p:nvSpPr>
+          <p:cNvPr id="3" name="灯片编号占位符 2"/>
+          <p:cNvSpPr>
+            <a:spLocks noGrp="1"/>
+          </p:cNvSpPr>
+          <p:nvPr>
+            <p:ph type="sldNum" sz="quarter" idx="12"/>
+          </p:nvPr>
+        </p:nvSpPr>
+        <p:spPr/>
+        <p:txBody>
+          <a:bodyPr/>
+          <a:lstStyle/>
+          <a:p>
+            <a:fld id="{C8682688-2DC9-4990-BBF8-8D9E27776FB3}" type="slidenum">
+              <a:rPr lang="zh-CN" altLang="en-US" smtClean="0"/>
+            </a:fld>
+            <a:endParaRPr lang="zh-CN" altLang="en-US"/>
+          </a:p>
+        </p:txBody>
+      </p:sp>
+      <p:sp>
+        <p:nvSpPr>
+          <p:cNvPr id="4" name="TextBox 7"/>
+          <p:cNvSpPr txBox="1"/>
+          <p:nvPr/>
+        </p:nvSpPr>
+        <p:spPr>
+          <a:xfrm>
+            <a:off x="1039163" y="1400423"/>
+            <a:ext cx="6139844" cy="460375"/>
+          </a:xfrm>
+          <a:prstGeom prst="rect">
+            <a:avLst/>
+          </a:prstGeom>
+          <a:noFill/>
+        </p:spPr>
+        <p:txBody>
+          <a:bodyPr wrap="square" rtlCol="0">
+            <a:spAutoFit/>
+          </a:bodyPr>
+          <a:p>
+            <a:pPr algn="ctr"/>
+            <a:r>
+              <a:rPr lang="zh-CN" altLang="en-US" sz="2400" dirty="0">
+                <a:solidFill>
+                  <a:schemeClr val="accent1">
+                    <a:lumMod val="75000"/>
+                  </a:schemeClr>
+                </a:solidFill>
+              </a:rPr>
+              <a:t>应对焦虑，增强自信</a:t>
+            </a:r>
+            <a:endParaRPr lang="zh-CN" altLang="en-US" sz="2400" dirty="0">
+              <a:solidFill>
+                <a:schemeClr val="accent1">
+                  <a:lumMod val="75000"/>
+                </a:schemeClr>
+              </a:solidFill>
+            </a:endParaRPr>
+          </a:p>
+        </p:txBody>
+      </p:sp>
+      <p:sp>
+        <p:nvSpPr>
+          <p:cNvPr id="5" name="文本框 4"/>
+          <p:cNvSpPr txBox="1"/>
+          <p:nvPr/>
+        </p:nvSpPr>
+        <p:spPr>
+          <a:xfrm>
+            <a:off x="1726565" y="2206625"/>
+            <a:ext cx="5603240" cy="4246245"/>
+          </a:xfrm>
+          <a:prstGeom prst="rect">
+            <a:avLst/>
+          </a:prstGeom>
+          <a:noFill/>
+        </p:spPr>
+        <p:txBody>
+          <a:bodyPr wrap="square" rtlCol="0">
+            <a:spAutoFit/>
+          </a:bodyPr>
+          <a:p>
+            <a:pPr algn="l"/>
+            <a:r>
+              <a:rPr lang="zh-CN" altLang="en-US"/>
+              <a:t>随着对工作内容和对公司的熟悉，要不停的鼓励自己，</a:t>
+            </a:r>
+            <a:endParaRPr lang="zh-CN" altLang="en-US"/>
+          </a:p>
+          <a:p>
+            <a:pPr algn="l"/>
+            <a:endParaRPr lang="zh-CN" altLang="en-US"/>
+          </a:p>
+          <a:p>
+            <a:pPr algn="l"/>
+            <a:r>
+              <a:rPr lang="zh-CN" altLang="en-US"/>
+              <a:t>相信自己可以完成。研究表明自我效能感对于学生转</a:t>
+            </a:r>
+            <a:endParaRPr lang="zh-CN" altLang="en-US"/>
+          </a:p>
+          <a:p>
+            <a:pPr algn="l"/>
+            <a:endParaRPr lang="zh-CN" altLang="en-US"/>
+          </a:p>
+          <a:p>
+            <a:pPr algn="l"/>
+            <a:r>
+              <a:rPr lang="zh-CN" altLang="en-US"/>
+              <a:t>向工作者的适应过程有非常大的帮助。也就是说，其</a:t>
+            </a:r>
+            <a:endParaRPr lang="zh-CN" altLang="en-US"/>
+          </a:p>
+          <a:p>
+            <a:pPr algn="l"/>
+            <a:endParaRPr lang="zh-CN" altLang="en-US"/>
+          </a:p>
+          <a:p>
+            <a:pPr algn="l"/>
+            <a:r>
+              <a:rPr lang="zh-CN" altLang="en-US"/>
+              <a:t>实这些初始工作没有你想象的那么难，你最大的敌人</a:t>
+            </a:r>
+            <a:endParaRPr lang="zh-CN" altLang="en-US"/>
+          </a:p>
+          <a:p>
+            <a:pPr algn="l"/>
+            <a:endParaRPr lang="zh-CN" altLang="en-US"/>
+          </a:p>
+          <a:p>
+            <a:pPr algn="l"/>
+            <a:r>
+              <a:rPr lang="zh-CN" altLang="en-US"/>
+              <a:t>就是自己不相信自己。</a:t>
+            </a:r>
+            <a:endParaRPr lang="zh-CN" altLang="en-US"/>
+          </a:p>
+          <a:p>
+            <a:pPr algn="l"/>
+            <a:endParaRPr lang="zh-CN" altLang="en-US"/>
+          </a:p>
+          <a:p>
+            <a:pPr algn="l"/>
+            <a:endParaRPr lang="zh-CN" altLang="en-US"/>
+          </a:p>
+          <a:p>
+            <a:pPr algn="l"/>
+            <a:endParaRPr lang="zh-CN" altLang="en-US"/>
+          </a:p>
+          <a:p>
+            <a:pPr algn="l"/>
+            <a:endParaRPr lang="zh-CN" altLang="en-US"/>
+          </a:p>
+          <a:p>
+            <a:pPr algn="l"/>
+            <a:endParaRPr lang="zh-CN" altLang="en-US"/>
+          </a:p>
+          <a:p>
+            <a:pPr algn="l"/>
+            <a:r>
+              <a:rPr lang="zh-CN" altLang="en-US"/>
+              <a:t> </a:t>
+            </a:r>
+            <a:endParaRPr lang="en-US" altLang="zh-CN"/>
+          </a:p>
+        </p:txBody>
+      </p:sp>
+    </p:spTree>
+  </p:cSld>
+  <p:clrMapOvr>
+    <a:masterClrMapping/>
+  </p:clrMapOvr>
+  <p:timing>
+    <p:tnLst>
+      <p:par>
+        <p:cTn id="1" dur="indefinite" restart="never" nodeType="tmRoot"/>
+      </p:par>
+    </p:tnLst>
+  </p:timing>
+</p:sld>
+</file>
+
+<file path=ppt/slides/slide6.xml><?xml version="1.0" encoding="utf-8"?>
+<p:sld xmlns:a="http://schemas.openxmlformats.org/drawingml/2006/main" xmlns:r="http://schemas.openxmlformats.org/officeDocument/2006/relationships" xmlns:p="http://schemas.openxmlformats.org/presentationml/2006/main">
+  <p:cSld>
+    <p:spTree>
+      <p:nvGrpSpPr>
+        <p:cNvPr id="1" name=""/>
+        <p:cNvGrpSpPr/>
+        <p:nvPr/>
+      </p:nvGrpSpPr>
+      <p:grpSpPr>
+        <a:xfrm>
+          <a:off x="0" y="0"/>
+          <a:ext cx="0" cy="0"/>
+          <a:chOff x="0" y="0"/>
+          <a:chExt cx="0" cy="0"/>
+        </a:xfrm>
+      </p:grpSpPr>
+      <p:sp>
+        <p:nvSpPr>
+          <p:cNvPr id="2" name="标题 1"/>
+          <p:cNvSpPr>
+            <a:spLocks noGrp="1"/>
+          </p:cNvSpPr>
+          <p:nvPr>
+            <p:ph type="title"/>
+          </p:nvPr>
+        </p:nvSpPr>
+        <p:spPr/>
+        <p:txBody>
+          <a:bodyPr/>
+          <a:lstStyle/>
+          <a:p>
+            <a:r>
+              <a:rPr lang="zh-CN" altLang="en-US" dirty="0" smtClean="0"/>
+              <a:t>主题</a:t>
+            </a:r>
+            <a:endParaRPr lang="zh-CN" altLang="en-US" dirty="0"/>
+          </a:p>
+        </p:txBody>
+      </p:sp>
+      <p:sp>
+        <p:nvSpPr>
+          <p:cNvPr id="3" name="灯片编号占位符 2"/>
+          <p:cNvSpPr>
+            <a:spLocks noGrp="1"/>
+          </p:cNvSpPr>
+          <p:nvPr>
+            <p:ph type="sldNum" sz="quarter" idx="12"/>
+          </p:nvPr>
+        </p:nvSpPr>
+        <p:spPr/>
+        <p:txBody>
+          <a:bodyPr/>
+          <a:lstStyle/>
+          <a:p>
+            <a:fld id="{C8682688-2DC9-4990-BBF8-8D9E27776FB3}" type="slidenum">
+              <a:rPr lang="zh-CN" altLang="en-US" smtClean="0"/>
+            </a:fld>
+            <a:endParaRPr lang="zh-CN" altLang="en-US"/>
+          </a:p>
+        </p:txBody>
+      </p:sp>
+      <p:sp>
+        <p:nvSpPr>
+          <p:cNvPr id="4" name="文本框 3"/>
+          <p:cNvSpPr txBox="1"/>
+          <p:nvPr/>
+        </p:nvSpPr>
+        <p:spPr>
+          <a:xfrm>
+            <a:off x="194310" y="1334770"/>
+            <a:ext cx="3941445" cy="2676525"/>
+          </a:xfrm>
+          <a:prstGeom prst="rect">
+            <a:avLst/>
+          </a:prstGeom>
+          <a:noFill/>
+        </p:spPr>
+        <p:txBody>
+          <a:bodyPr wrap="square" rtlCol="0">
+            <a:spAutoFit/>
+          </a:bodyPr>
+          <a:p>
+            <a:pPr algn="l"/>
+            <a:r>
+              <a:rPr lang="zh-CN" altLang="en-US"/>
+              <a:t>最后</a:t>
+            </a:r>
+            <a:endParaRPr lang="zh-CN" altLang="en-US"/>
+          </a:p>
+          <a:p>
+            <a:pPr algn="l"/>
+            <a:endParaRPr lang="zh-CN" altLang="en-US"/>
+          </a:p>
+          <a:p>
+            <a:pPr algn="l"/>
+            <a:r>
+              <a:rPr lang="zh-CN" altLang="en-US"/>
+              <a:t>推荐新人们可以试试每天来一杯汤臣</a:t>
+            </a:r>
+            <a:endParaRPr lang="zh-CN" altLang="en-US"/>
+          </a:p>
+          <a:p>
+            <a:pPr algn="l"/>
+            <a:endParaRPr lang="zh-CN" altLang="en-US"/>
+          </a:p>
+          <a:p>
+            <a:pPr algn="l"/>
+            <a:r>
+              <a:rPr lang="zh-CN" altLang="en-US"/>
+              <a:t>倍健的</a:t>
+            </a:r>
+            <a:r>
+              <a:rPr lang="zh-CN" altLang="en-US" sz="2400">
+                <a:solidFill>
+                  <a:srgbClr val="FF0000"/>
+                </a:solidFill>
+              </a:rPr>
+              <a:t>蛋白粉</a:t>
+            </a:r>
+            <a:r>
+              <a:rPr lang="zh-CN" altLang="en-US"/>
+              <a:t>。</a:t>
+            </a:r>
+            <a:endParaRPr lang="zh-CN" altLang="en-US"/>
+          </a:p>
+          <a:p>
+            <a:pPr algn="l"/>
+            <a:endParaRPr lang="zh-CN" altLang="en-US"/>
+          </a:p>
+          <a:p>
+            <a:pPr algn="l"/>
+            <a:r>
+              <a:rPr lang="zh-CN" altLang="en-US"/>
+              <a:t>提高免疫力、缓解疲劳，更好地迎接</a:t>
+            </a:r>
+            <a:endParaRPr lang="zh-CN" altLang="en-US"/>
+          </a:p>
+          <a:p>
+            <a:pPr algn="l"/>
+            <a:endParaRPr lang="zh-CN" altLang="en-US"/>
+          </a:p>
+          <a:p>
+            <a:pPr algn="l"/>
+            <a:r>
+              <a:rPr lang="zh-CN" altLang="en-US"/>
+              <a:t>新的挑战！</a:t>
+            </a:r>
+            <a:endParaRPr lang="zh-CN" altLang="en-US"/>
+          </a:p>
+        </p:txBody>
+      </p:sp>
+      <p:pic>
+        <p:nvPicPr>
+          <p:cNvPr id="5" name="图片 4"/>
+          <p:cNvPicPr>
+            <a:picLocks noChangeAspect="1"/>
+          </p:cNvPicPr>
+          <p:nvPr/>
+        </p:nvPicPr>
+        <p:blipFill>
+          <a:blip r:embed="rId1"/>
+          <a:stretch>
+            <a:fillRect/>
+          </a:stretch>
+        </p:blipFill>
+        <p:spPr>
+          <a:xfrm>
+            <a:off x="4184015" y="1099185"/>
+            <a:ext cx="4563110" cy="4563110"/>
+          </a:xfrm>
+          <a:prstGeom prst="rect">
+            <a:avLst/>
+          </a:prstGeom>
+        </p:spPr>
+      </p:pic>
+    </p:spTree>
+  </p:cSld>
+  <p:clrMapOvr>
+    <a:masterClrMapping/>
+  </p:clrMapOvr>
+  <p:timing>
+    <p:tnLst>
+      <p:par>
+        <p:cTn id="1" dur="indefinite" restart="never" nodeType="tmRoot"/>
+      </p:par>
+    </p:tnLst>
+  </p:timing>
+</p:sld>
+</file>
+
+<file path=ppt/slides/slide7.xml><?xml version="1.0" encoding="utf-8"?>
 <p:sld xmlns:a="http://schemas.openxmlformats.org/drawingml/2006/main" xmlns:r="http://schemas.openxmlformats.org/officeDocument/2006/relationships" xmlns:p="http://schemas.openxmlformats.org/presentationml/2006/main">
   <p:cSld>
     <p:spTree>

</xml_diff>